<commit_message>
Revise figure to include info files
</commit_message>
<xml_diff>
--- a/memorandum/figures/figures.pptx
+++ b/memorandum/figures/figures.pptx
@@ -7570,7 +7570,7 @@
         </p:nvSpPr>
         <p:spPr>
           <a:xfrm>
-            <a:off x="3980195" y="1140727"/>
+            <a:off x="3980195" y="996711"/>
             <a:ext cx="1276772" cy="707886"/>
           </a:xfrm>
           <a:prstGeom prst="rect">
@@ -7621,7 +7621,7 @@
         </p:nvGrpSpPr>
         <p:grpSpPr>
           <a:xfrm>
-            <a:off x="323528" y="1124744"/>
+            <a:off x="323528" y="980728"/>
             <a:ext cx="2098973" cy="1633240"/>
             <a:chOff x="4690610" y="2539504"/>
             <a:chExt cx="2736305" cy="1549265"/>
@@ -8473,7 +8473,7 @@
         </p:nvGrpSpPr>
         <p:grpSpPr>
           <a:xfrm>
-            <a:off x="2688163" y="1124745"/>
+            <a:off x="2688163" y="980729"/>
             <a:ext cx="2098973" cy="1633239"/>
             <a:chOff x="4690610" y="2524343"/>
             <a:chExt cx="2736305" cy="1549264"/>
@@ -9356,7 +9356,7 @@
         </p:nvGrpSpPr>
         <p:grpSpPr>
           <a:xfrm>
-            <a:off x="5075168" y="1124745"/>
+            <a:off x="5075168" y="980729"/>
             <a:ext cx="2098973" cy="1633239"/>
             <a:chOff x="4690610" y="2524343"/>
             <a:chExt cx="2736305" cy="1549264"/>
@@ -10220,7 +10220,7 @@
         </p:nvSpPr>
         <p:spPr>
           <a:xfrm>
-            <a:off x="5564614" y="4458094"/>
+            <a:off x="5515299" y="5373216"/>
             <a:ext cx="1218710" cy="947249"/>
           </a:xfrm>
           <a:prstGeom prst="flowChartDocument">
@@ -10280,7 +10280,7 @@
         </p:nvGrpSpPr>
         <p:grpSpPr>
           <a:xfrm>
-            <a:off x="7567127" y="1369628"/>
+            <a:off x="7596336" y="1225612"/>
             <a:ext cx="1469369" cy="999455"/>
             <a:chOff x="3227276" y="2065138"/>
             <a:chExt cx="1052334" cy="715790"/>
@@ -10488,7 +10488,7 @@
         </p:nvSpPr>
         <p:spPr>
           <a:xfrm>
-            <a:off x="7602994" y="1727598"/>
+            <a:off x="7632203" y="1583582"/>
             <a:ext cx="1130871" cy="400110"/>
           </a:xfrm>
           <a:prstGeom prst="rect">
@@ -10520,102 +10520,6 @@
           </a:p>
         </p:txBody>
       </p:sp>
-      <p:cxnSp>
-        <p:nvCxnSpPr>
-          <p:cNvPr id="52" name="Straight Arrow Connector 51"/>
-          <p:cNvCxnSpPr>
-            <a:stCxn id="27" idx="3"/>
-            <a:endCxn id="30" idx="1"/>
-          </p:cNvCxnSpPr>
-          <p:nvPr/>
-        </p:nvCxnSpPr>
-        <p:spPr bwMode="auto">
-          <a:xfrm>
-            <a:off x="2422501" y="1941364"/>
-            <a:ext cx="265662" cy="1"/>
-          </a:xfrm>
-          <a:prstGeom prst="straightConnector1">
-            <a:avLst/>
-          </a:prstGeom>
-          <a:solidFill>
-            <a:schemeClr val="accent1"/>
-          </a:solidFill>
-          <a:ln w="15875" cap="flat" cmpd="sng" algn="ctr">
-            <a:solidFill>
-              <a:schemeClr val="tx1"/>
-            </a:solidFill>
-            <a:prstDash val="solid"/>
-            <a:round/>
-            <a:headEnd type="oval" w="med" len="med"/>
-            <a:tailEnd type="triangle"/>
-          </a:ln>
-          <a:effectLst/>
-        </p:spPr>
-      </p:cxnSp>
-      <p:cxnSp>
-        <p:nvCxnSpPr>
-          <p:cNvPr id="53" name="Straight Arrow Connector 52"/>
-          <p:cNvCxnSpPr>
-            <a:stCxn id="30" idx="3"/>
-            <a:endCxn id="33" idx="1"/>
-          </p:cNvCxnSpPr>
-          <p:nvPr/>
-        </p:nvCxnSpPr>
-        <p:spPr bwMode="auto">
-          <a:xfrm>
-            <a:off x="4787136" y="1941365"/>
-            <a:ext cx="288032" cy="0"/>
-          </a:xfrm>
-          <a:prstGeom prst="straightConnector1">
-            <a:avLst/>
-          </a:prstGeom>
-          <a:solidFill>
-            <a:schemeClr val="accent1"/>
-          </a:solidFill>
-          <a:ln w="15875" cap="flat" cmpd="sng" algn="ctr">
-            <a:solidFill>
-              <a:schemeClr val="tx1"/>
-            </a:solidFill>
-            <a:prstDash val="solid"/>
-            <a:round/>
-            <a:headEnd type="oval" w="med" len="med"/>
-            <a:tailEnd type="triangle"/>
-          </a:ln>
-          <a:effectLst/>
-        </p:spPr>
-      </p:cxnSp>
-      <p:cxnSp>
-        <p:nvCxnSpPr>
-          <p:cNvPr id="54" name="Straight Arrow Connector 53"/>
-          <p:cNvCxnSpPr>
-            <a:stCxn id="33" idx="3"/>
-            <a:endCxn id="42" idx="1"/>
-          </p:cNvCxnSpPr>
-          <p:nvPr/>
-        </p:nvCxnSpPr>
-        <p:spPr bwMode="auto">
-          <a:xfrm flipV="1">
-            <a:off x="7174141" y="1941364"/>
-            <a:ext cx="392986" cy="1"/>
-          </a:xfrm>
-          <a:prstGeom prst="straightConnector1">
-            <a:avLst/>
-          </a:prstGeom>
-          <a:solidFill>
-            <a:schemeClr val="accent1"/>
-          </a:solidFill>
-          <a:ln w="15875" cap="flat" cmpd="sng" algn="ctr">
-            <a:solidFill>
-              <a:schemeClr val="tx1"/>
-            </a:solidFill>
-            <a:prstDash val="solid"/>
-            <a:round/>
-            <a:headEnd type="oval" w="med" len="med"/>
-            <a:tailEnd type="triangle"/>
-          </a:ln>
-          <a:effectLst/>
-        </p:spPr>
-      </p:cxnSp>
       <p:sp>
         <p:nvSpPr>
           <p:cNvPr id="59" name="TextBox 58"/>
@@ -10624,7 +10528,7 @@
         </p:nvSpPr>
         <p:spPr>
           <a:xfrm>
-            <a:off x="7495119" y="2804013"/>
+            <a:off x="7495119" y="2276872"/>
             <a:ext cx="1469369" cy="671603"/>
           </a:xfrm>
           <a:prstGeom prst="rect">
@@ -10906,7 +10810,7 @@
         </p:nvSpPr>
         <p:spPr bwMode="auto">
           <a:xfrm rot="16200000">
-            <a:off x="1139249" y="2827260"/>
+            <a:off x="1139249" y="2777106"/>
             <a:ext cx="476985" cy="484632"/>
           </a:xfrm>
           <a:prstGeom prst="stripedRightArrow">
@@ -10972,7 +10876,7 @@
         </p:nvSpPr>
         <p:spPr>
           <a:xfrm>
-            <a:off x="3128294" y="3501008"/>
+            <a:off x="3133020" y="4465201"/>
             <a:ext cx="1218710" cy="835990"/>
           </a:xfrm>
           <a:prstGeom prst="flowChartDocument">
@@ -11049,7 +10953,7 @@
         </p:nvSpPr>
         <p:spPr bwMode="auto">
           <a:xfrm rot="16200000">
-            <a:off x="3503883" y="2827260"/>
+            <a:off x="3503883" y="2777106"/>
             <a:ext cx="476985" cy="484632"/>
           </a:xfrm>
           <a:prstGeom prst="stripedRightArrow">
@@ -11115,7 +11019,7 @@
         </p:nvSpPr>
         <p:spPr>
           <a:xfrm>
-            <a:off x="5515299" y="3501008"/>
+            <a:off x="5520025" y="4446838"/>
             <a:ext cx="1218710" cy="816537"/>
           </a:xfrm>
           <a:prstGeom prst="flowChartDocument">
@@ -11196,7 +11100,7 @@
         </p:nvSpPr>
         <p:spPr bwMode="auto">
           <a:xfrm rot="16200000">
-            <a:off x="5886162" y="2827259"/>
+            <a:off x="5886162" y="2777105"/>
             <a:ext cx="476985" cy="484632"/>
           </a:xfrm>
           <a:prstGeom prst="stripedRightArrow">
@@ -11262,8 +11166,8 @@
         </p:nvSpPr>
         <p:spPr>
           <a:xfrm>
-            <a:off x="20072" y="3140968"/>
-            <a:ext cx="914623" cy="369332"/>
+            <a:off x="20071" y="2852936"/>
+            <a:ext cx="1743617" cy="646331"/>
           </a:xfrm>
           <a:prstGeom prst="rect">
             <a:avLst/>
@@ -11280,17 +11184,37 @@
           <a:lstStyle/>
           <a:p>
             <a:r>
+              <a:rPr lang="en-US" b="1" dirty="0" smtClean="0">
+                <a:latin typeface="+mj-lt"/>
+              </a:rPr>
+              <a:t>Inputs</a:t>
+            </a:r>
+            <a:r>
               <a:rPr lang="en-US" b="1" dirty="0">
-                <a:latin typeface="+mn-lt"/>
+                <a:latin typeface="+mj-lt"/>
               </a:rPr>
-              <a:t>I</a:t>
+              <a:t> </a:t>
             </a:r>
             <a:r>
               <a:rPr lang="en-US" b="1" dirty="0" smtClean="0">
-                <a:latin typeface="+mn-lt"/>
+                <a:latin typeface="+mj-lt"/>
               </a:rPr>
-              <a:t>nputs</a:t>
+              <a:t>&amp; </a:t>
             </a:r>
+            <a:br>
+              <a:rPr lang="en-US" b="1" dirty="0" smtClean="0">
+                <a:latin typeface="+mj-lt"/>
+              </a:rPr>
+            </a:br>
+            <a:r>
+              <a:rPr lang="en-US" b="1" dirty="0" smtClean="0">
+                <a:latin typeface="+mj-lt"/>
+              </a:rPr>
+              <a:t>Aux files</a:t>
+            </a:r>
+            <a:endParaRPr lang="en-US" b="1" dirty="0" smtClean="0">
+              <a:latin typeface="+mj-lt"/>
+            </a:endParaRPr>
           </a:p>
         </p:txBody>
       </p:sp>
@@ -11302,7 +11226,7 @@
         </p:nvSpPr>
         <p:spPr>
           <a:xfrm>
-            <a:off x="20071" y="692696"/>
+            <a:off x="20071" y="548680"/>
             <a:ext cx="1455585" cy="369332"/>
           </a:xfrm>
           <a:prstGeom prst="rect">
@@ -11336,7 +11260,7 @@
         </p:nvSpPr>
         <p:spPr>
           <a:xfrm>
-            <a:off x="7408890" y="692696"/>
+            <a:off x="7408890" y="548680"/>
             <a:ext cx="963234" cy="369332"/>
           </a:xfrm>
           <a:prstGeom prst="rect">
@@ -11359,6 +11283,474 @@
             </a:r>
             <a:endParaRPr lang="en-US" b="1" dirty="0" smtClean="0">
               <a:latin typeface="+mn-lt"/>
+            </a:endParaRPr>
+          </a:p>
+        </p:txBody>
+      </p:sp>
+      <p:sp>
+        <p:nvSpPr>
+          <p:cNvPr id="37" name="Flowchart: Document 36"/>
+          <p:cNvSpPr/>
+          <p:nvPr/>
+        </p:nvSpPr>
+        <p:spPr>
+          <a:xfrm>
+            <a:off x="3133020" y="3510300"/>
+            <a:ext cx="1218710" cy="835990"/>
+          </a:xfrm>
+          <a:prstGeom prst="flowChartDocument">
+            <a:avLst/>
+          </a:prstGeom>
+          <a:solidFill>
+            <a:srgbClr val="FFEAA8"/>
+          </a:solidFill>
+          <a:ln>
+            <a:noFill/>
+          </a:ln>
+        </p:spPr>
+        <p:style>
+          <a:lnRef idx="2">
+            <a:schemeClr val="accent1">
+              <a:shade val="50000"/>
+            </a:schemeClr>
+          </a:lnRef>
+          <a:fillRef idx="1">
+            <a:schemeClr val="accent1"/>
+          </a:fillRef>
+          <a:effectRef idx="0">
+            <a:schemeClr val="accent1"/>
+          </a:effectRef>
+          <a:fontRef idx="minor">
+            <a:schemeClr val="lt1"/>
+          </a:fontRef>
+        </p:style>
+        <p:txBody>
+          <a:bodyPr rtlCol="0" anchor="ctr"/>
+          <a:lstStyle/>
+          <a:p>
+            <a:pPr algn="ctr"/>
+            <a:r>
+              <a:rPr lang="en-US" dirty="0" err="1" smtClean="0">
+                <a:solidFill>
+                  <a:schemeClr val="tx1"/>
+                </a:solidFill>
+                <a:latin typeface="Consolas" panose="020B0609020204030204" pitchFamily="49" charset="0"/>
+                <a:cs typeface="Consolas" panose="020B0609020204030204" pitchFamily="49" charset="0"/>
+              </a:rPr>
+              <a:t>prepro</a:t>
+            </a:r>
+            <a:r>
+              <a:rPr lang="en-US" dirty="0" smtClean="0">
+                <a:solidFill>
+                  <a:schemeClr val="tx1"/>
+                </a:solidFill>
+                <a:latin typeface="Consolas" panose="020B0609020204030204" pitchFamily="49" charset="0"/>
+                <a:cs typeface="Consolas" panose="020B0609020204030204" pitchFamily="49" charset="0"/>
+              </a:rPr>
+              <a:t/>
+            </a:r>
+            <a:br>
+              <a:rPr lang="en-US" dirty="0" smtClean="0">
+                <a:solidFill>
+                  <a:schemeClr val="tx1"/>
+                </a:solidFill>
+                <a:latin typeface="Consolas" panose="020B0609020204030204" pitchFamily="49" charset="0"/>
+                <a:cs typeface="Consolas" panose="020B0609020204030204" pitchFamily="49" charset="0"/>
+              </a:rPr>
+            </a:br>
+            <a:r>
+              <a:rPr lang="en-US" b="1" dirty="0" smtClean="0">
+                <a:solidFill>
+                  <a:schemeClr val="tx1"/>
+                </a:solidFill>
+                <a:latin typeface="Calibri Light" panose="020F0302020204030204" pitchFamily="34" charset="0"/>
+              </a:rPr>
+              <a:t>info file</a:t>
+            </a:r>
+            <a:endParaRPr lang="en-US" b="1" dirty="0">
+              <a:solidFill>
+                <a:schemeClr val="tx1"/>
+              </a:solidFill>
+              <a:latin typeface="Calibri Light" panose="020F0302020204030204" pitchFamily="34" charset="0"/>
+            </a:endParaRPr>
+          </a:p>
+        </p:txBody>
+      </p:sp>
+      <p:sp>
+        <p:nvSpPr>
+          <p:cNvPr id="40" name="Flowchart: Document 39"/>
+          <p:cNvSpPr/>
+          <p:nvPr/>
+        </p:nvSpPr>
+        <p:spPr>
+          <a:xfrm>
+            <a:off x="5515299" y="3510300"/>
+            <a:ext cx="1218710" cy="835990"/>
+          </a:xfrm>
+          <a:prstGeom prst="flowChartDocument">
+            <a:avLst/>
+          </a:prstGeom>
+          <a:solidFill>
+            <a:srgbClr val="FFEAA8"/>
+          </a:solidFill>
+          <a:ln>
+            <a:noFill/>
+          </a:ln>
+        </p:spPr>
+        <p:style>
+          <a:lnRef idx="2">
+            <a:schemeClr val="accent1">
+              <a:shade val="50000"/>
+            </a:schemeClr>
+          </a:lnRef>
+          <a:fillRef idx="1">
+            <a:schemeClr val="accent1"/>
+          </a:fillRef>
+          <a:effectRef idx="0">
+            <a:schemeClr val="accent1"/>
+          </a:effectRef>
+          <a:fontRef idx="minor">
+            <a:schemeClr val="lt1"/>
+          </a:fontRef>
+        </p:style>
+        <p:txBody>
+          <a:bodyPr rtlCol="0" anchor="ctr"/>
+          <a:lstStyle/>
+          <a:p>
+            <a:pPr algn="ctr"/>
+            <a:r>
+              <a:rPr lang="en-US" dirty="0">
+                <a:solidFill>
+                  <a:schemeClr val="tx1"/>
+                </a:solidFill>
+                <a:latin typeface="Consolas" panose="020B0609020204030204" pitchFamily="49" charset="0"/>
+                <a:cs typeface="Consolas" panose="020B0609020204030204" pitchFamily="49" charset="0"/>
+              </a:rPr>
+              <a:t>e</a:t>
+            </a:r>
+            <a:r>
+              <a:rPr lang="en-US" dirty="0" smtClean="0">
+                <a:solidFill>
+                  <a:schemeClr val="tx1"/>
+                </a:solidFill>
+                <a:latin typeface="Consolas" panose="020B0609020204030204" pitchFamily="49" charset="0"/>
+                <a:cs typeface="Consolas" panose="020B0609020204030204" pitchFamily="49" charset="0"/>
+              </a:rPr>
+              <a:t>xec</a:t>
+            </a:r>
+            <a:r>
+              <a:rPr lang="en-US" b="1" dirty="0" smtClean="0">
+                <a:solidFill>
+                  <a:schemeClr val="tx1"/>
+                </a:solidFill>
+                <a:latin typeface="Calibri Light" panose="020F0302020204030204" pitchFamily="34" charset="0"/>
+              </a:rPr>
+              <a:t/>
+            </a:r>
+            <a:br>
+              <a:rPr lang="en-US" b="1" dirty="0" smtClean="0">
+                <a:solidFill>
+                  <a:schemeClr val="tx1"/>
+                </a:solidFill>
+                <a:latin typeface="Calibri Light" panose="020F0302020204030204" pitchFamily="34" charset="0"/>
+              </a:rPr>
+            </a:br>
+            <a:r>
+              <a:rPr lang="en-US" b="1" dirty="0" smtClean="0">
+                <a:solidFill>
+                  <a:schemeClr val="tx1"/>
+                </a:solidFill>
+                <a:latin typeface="Calibri Light" panose="020F0302020204030204" pitchFamily="34" charset="0"/>
+              </a:rPr>
+              <a:t>info file</a:t>
+            </a:r>
+            <a:endParaRPr lang="en-US" b="1" dirty="0">
+              <a:solidFill>
+                <a:schemeClr val="tx1"/>
+              </a:solidFill>
+              <a:latin typeface="Calibri Light" panose="020F0302020204030204" pitchFamily="34" charset="0"/>
+            </a:endParaRPr>
+          </a:p>
+        </p:txBody>
+      </p:sp>
+      <p:cxnSp>
+        <p:nvCxnSpPr>
+          <p:cNvPr id="5" name="Elbow Connector 4"/>
+          <p:cNvCxnSpPr>
+            <a:stCxn id="27" idx="3"/>
+            <a:endCxn id="37" idx="1"/>
+          </p:cNvCxnSpPr>
+          <p:nvPr/>
+        </p:nvCxnSpPr>
+        <p:spPr>
+          <a:xfrm>
+            <a:off x="2422501" y="1797348"/>
+            <a:ext cx="710519" cy="2130947"/>
+          </a:xfrm>
+          <a:prstGeom prst="bentConnector3">
+            <a:avLst>
+              <a:gd name="adj1" fmla="val 21249"/>
+            </a:avLst>
+          </a:prstGeom>
+          <a:ln w="12700">
+            <a:solidFill>
+              <a:schemeClr val="tx1"/>
+            </a:solidFill>
+            <a:prstDash val="dash"/>
+            <a:headEnd type="oval" w="sm" len="sm"/>
+            <a:tailEnd type="triangle" w="lg" len="med"/>
+          </a:ln>
+        </p:spPr>
+        <p:style>
+          <a:lnRef idx="1">
+            <a:schemeClr val="accent1"/>
+          </a:lnRef>
+          <a:fillRef idx="0">
+            <a:schemeClr val="accent1"/>
+          </a:fillRef>
+          <a:effectRef idx="0">
+            <a:schemeClr val="accent1"/>
+          </a:effectRef>
+          <a:fontRef idx="minor">
+            <a:schemeClr val="tx1"/>
+          </a:fontRef>
+        </p:style>
+      </p:cxnSp>
+      <p:cxnSp>
+        <p:nvCxnSpPr>
+          <p:cNvPr id="41" name="Elbow Connector 40"/>
+          <p:cNvCxnSpPr>
+            <a:stCxn id="30" idx="3"/>
+            <a:endCxn id="40" idx="1"/>
+          </p:cNvCxnSpPr>
+          <p:nvPr/>
+        </p:nvCxnSpPr>
+        <p:spPr>
+          <a:xfrm>
+            <a:off x="4787136" y="1797349"/>
+            <a:ext cx="728163" cy="2130946"/>
+          </a:xfrm>
+          <a:prstGeom prst="bentConnector3">
+            <a:avLst>
+              <a:gd name="adj1" fmla="val 21946"/>
+            </a:avLst>
+          </a:prstGeom>
+          <a:ln w="12700">
+            <a:solidFill>
+              <a:schemeClr val="tx1"/>
+            </a:solidFill>
+            <a:prstDash val="dash"/>
+            <a:headEnd type="oval" w="sm" len="sm"/>
+            <a:tailEnd type="triangle" w="lg" len="med"/>
+          </a:ln>
+        </p:spPr>
+        <p:style>
+          <a:lnRef idx="1">
+            <a:schemeClr val="accent1"/>
+          </a:lnRef>
+          <a:fillRef idx="0">
+            <a:schemeClr val="accent1"/>
+          </a:fillRef>
+          <a:effectRef idx="0">
+            <a:schemeClr val="accent1"/>
+          </a:effectRef>
+          <a:fontRef idx="minor">
+            <a:schemeClr val="tx1"/>
+          </a:fontRef>
+        </p:style>
+      </p:cxnSp>
+      <p:cxnSp>
+        <p:nvCxnSpPr>
+          <p:cNvPr id="50" name="Elbow Connector 49"/>
+          <p:cNvCxnSpPr>
+            <a:stCxn id="33" idx="3"/>
+            <a:endCxn id="55" idx="1"/>
+          </p:cNvCxnSpPr>
+          <p:nvPr/>
+        </p:nvCxnSpPr>
+        <p:spPr>
+          <a:xfrm>
+            <a:off x="7174141" y="1797349"/>
+            <a:ext cx="442577" cy="2130946"/>
+          </a:xfrm>
+          <a:prstGeom prst="bentConnector3">
+            <a:avLst>
+              <a:gd name="adj1" fmla="val 50000"/>
+            </a:avLst>
+          </a:prstGeom>
+          <a:ln w="12700">
+            <a:solidFill>
+              <a:schemeClr val="tx1"/>
+            </a:solidFill>
+            <a:prstDash val="dash"/>
+            <a:headEnd type="oval" w="sm" len="sm"/>
+            <a:tailEnd type="triangle" w="lg" len="med"/>
+          </a:ln>
+        </p:spPr>
+        <p:style>
+          <a:lnRef idx="1">
+            <a:schemeClr val="accent1"/>
+          </a:lnRef>
+          <a:fillRef idx="0">
+            <a:schemeClr val="accent1"/>
+          </a:fillRef>
+          <a:effectRef idx="0">
+            <a:schemeClr val="accent1"/>
+          </a:effectRef>
+          <a:fontRef idx="minor">
+            <a:schemeClr val="tx1"/>
+          </a:fontRef>
+        </p:style>
+      </p:cxnSp>
+      <p:sp>
+        <p:nvSpPr>
+          <p:cNvPr id="47" name="Striped Right Arrow 46"/>
+          <p:cNvSpPr/>
+          <p:nvPr/>
+        </p:nvSpPr>
+        <p:spPr bwMode="auto">
+          <a:xfrm>
+            <a:off x="7210732" y="1669748"/>
+            <a:ext cx="314057" cy="319092"/>
+          </a:xfrm>
+          <a:prstGeom prst="stripedRightArrow">
+            <a:avLst>
+              <a:gd name="adj1" fmla="val 50000"/>
+              <a:gd name="adj2" fmla="val 51196"/>
+            </a:avLst>
+          </a:prstGeom>
+          <a:solidFill>
+            <a:srgbClr val="C50006"/>
+          </a:solidFill>
+          <a:ln w="9525" cap="flat" cmpd="sng" algn="ctr">
+            <a:noFill/>
+            <a:prstDash val="solid"/>
+            <a:round/>
+            <a:headEnd type="none" w="med" len="med"/>
+            <a:tailEnd type="none" w="med" len="med"/>
+          </a:ln>
+          <a:effectLst/>
+        </p:spPr>
+        <p:txBody>
+          <a:bodyPr vert="horz" wrap="square" lIns="91440" tIns="45720" rIns="91440" bIns="45720" numCol="1" rtlCol="0" anchor="t" anchorCtr="0" compatLnSpc="1">
+            <a:prstTxWarp prst="textNoShape">
+              <a:avLst/>
+            </a:prstTxWarp>
+          </a:bodyPr>
+          <a:lstStyle/>
+          <a:p>
+            <a:pPr marL="0" marR="0" indent="0" algn="l" defTabSz="914400" rtl="0" eaLnBrk="0" fontAlgn="base" latinLnBrk="0" hangingPunct="0">
+              <a:lnSpc>
+                <a:spcPct val="100000"/>
+              </a:lnSpc>
+              <a:spcBef>
+                <a:spcPct val="0"/>
+              </a:spcBef>
+              <a:spcAft>
+                <a:spcPct val="0"/>
+              </a:spcAft>
+              <a:buClrTx/>
+              <a:buSzTx/>
+              <a:buFontTx/>
+              <a:buNone/>
+              <a:tabLst/>
+            </a:pPr>
+            <a:endParaRPr kumimoji="0" lang="en-US" sz="2400" b="0" i="0" u="none" strike="noStrike" cap="none" normalizeH="0" baseline="0">
+              <a:ln>
+                <a:noFill/>
+              </a:ln>
+              <a:solidFill>
+                <a:schemeClr val="tx1"/>
+              </a:solidFill>
+              <a:effectLst/>
+              <a:latin typeface="Times" charset="0"/>
+            </a:endParaRPr>
+          </a:p>
+        </p:txBody>
+      </p:sp>
+      <p:sp>
+        <p:nvSpPr>
+          <p:cNvPr id="55" name="Flowchart: Document 54"/>
+          <p:cNvSpPr/>
+          <p:nvPr/>
+        </p:nvSpPr>
+        <p:spPr>
+          <a:xfrm>
+            <a:off x="7616718" y="3510300"/>
+            <a:ext cx="1218710" cy="835990"/>
+          </a:xfrm>
+          <a:prstGeom prst="flowChartDocument">
+            <a:avLst/>
+          </a:prstGeom>
+          <a:solidFill>
+            <a:srgbClr val="FFEAA8"/>
+          </a:solidFill>
+          <a:ln>
+            <a:noFill/>
+          </a:ln>
+        </p:spPr>
+        <p:style>
+          <a:lnRef idx="2">
+            <a:schemeClr val="accent1">
+              <a:shade val="50000"/>
+            </a:schemeClr>
+          </a:lnRef>
+          <a:fillRef idx="1">
+            <a:schemeClr val="accent1"/>
+          </a:fillRef>
+          <a:effectRef idx="0">
+            <a:schemeClr val="accent1"/>
+          </a:effectRef>
+          <a:fontRef idx="minor">
+            <a:schemeClr val="lt1"/>
+          </a:fontRef>
+        </p:style>
+        <p:txBody>
+          <a:bodyPr rtlCol="0" anchor="ctr"/>
+          <a:lstStyle/>
+          <a:p>
+            <a:pPr algn="ctr"/>
+            <a:r>
+              <a:rPr lang="en-US" dirty="0" err="1" smtClean="0">
+                <a:solidFill>
+                  <a:schemeClr val="tx1"/>
+                </a:solidFill>
+                <a:latin typeface="Consolas" panose="020B0609020204030204" pitchFamily="49" charset="0"/>
+                <a:cs typeface="Consolas" panose="020B0609020204030204" pitchFamily="49" charset="0"/>
+              </a:rPr>
+              <a:t>postpro</a:t>
+            </a:r>
+            <a:r>
+              <a:rPr lang="en-US" b="1" dirty="0" smtClean="0">
+                <a:solidFill>
+                  <a:schemeClr val="tx1"/>
+                </a:solidFill>
+                <a:latin typeface="Calibri Light" panose="020F0302020204030204" pitchFamily="34" charset="0"/>
+              </a:rPr>
+              <a:t/>
+            </a:r>
+            <a:br>
+              <a:rPr lang="en-US" b="1" dirty="0" smtClean="0">
+                <a:solidFill>
+                  <a:schemeClr val="tx1"/>
+                </a:solidFill>
+                <a:latin typeface="Calibri Light" panose="020F0302020204030204" pitchFamily="34" charset="0"/>
+              </a:rPr>
+            </a:br>
+            <a:r>
+              <a:rPr lang="en-US" b="1" dirty="0" smtClean="0">
+                <a:solidFill>
+                  <a:schemeClr val="tx1"/>
+                </a:solidFill>
+                <a:latin typeface="Calibri Light" panose="020F0302020204030204" pitchFamily="34" charset="0"/>
+              </a:rPr>
+              <a:t>info file</a:t>
+            </a:r>
+            <a:endParaRPr lang="en-US" b="1" dirty="0">
+              <a:solidFill>
+                <a:schemeClr val="tx1"/>
+              </a:solidFill>
+              <a:latin typeface="Calibri Light" panose="020F0302020204030204" pitchFamily="34" charset="0"/>
             </a:endParaRPr>
           </a:p>
         </p:txBody>

</xml_diff>

<commit_message>
Minor revision on the figures
</commit_message>
<xml_diff>
--- a/memorandum/figures/figures.pptx
+++ b/memorandum/figures/figures.pptx
@@ -10528,8 +10528,8 @@
         </p:nvSpPr>
         <p:spPr>
           <a:xfrm>
-            <a:off x="7495119" y="2276872"/>
-            <a:ext cx="1469369" cy="671603"/>
+            <a:off x="7596336" y="2276872"/>
+            <a:ext cx="1469369" cy="899229"/>
           </a:xfrm>
           <a:prstGeom prst="rect">
             <a:avLst/>
@@ -10578,10 +10578,20 @@
             </a:br>
             <a:r>
               <a:rPr lang="en-US" sz="1200" i="1" kern="1000" spc="30" dirty="0" smtClean="0">
-                <a:latin typeface="+mn-lt"/>
                 <a:cs typeface="Franklin Gothic Book"/>
               </a:rPr>
-              <a:t>sensitivity analysis tool</a:t>
+              <a:t>for sensitivity or </a:t>
+            </a:r>
+            <a:br>
+              <a:rPr lang="en-US" sz="1200" i="1" kern="1000" spc="30" dirty="0" smtClean="0">
+                <a:cs typeface="Franklin Gothic Book"/>
+              </a:rPr>
+            </a:br>
+            <a:r>
+              <a:rPr lang="en-US" sz="1200" i="1" kern="1000" spc="30" dirty="0" smtClean="0">
+                <a:cs typeface="Franklin Gothic Book"/>
+              </a:rPr>
+              <a:t>uncertainty analyses</a:t>
             </a:r>
             <a:endParaRPr lang="en-US" sz="1200" i="1" kern="1000" spc="30" dirty="0">
               <a:latin typeface="+mn-lt"/>
@@ -11212,9 +11222,6 @@
               </a:rPr>
               <a:t>Aux files</a:t>
             </a:r>
-            <a:endParaRPr lang="en-US" b="1" dirty="0" smtClean="0">
-              <a:latin typeface="+mj-lt"/>
-            </a:endParaRPr>
           </a:p>
         </p:txBody>
       </p:sp>

</xml_diff>